<commit_message>
Deployed 49d9ae7 with MkDocs version: 1.5.3
</commit_message>
<xml_diff>
--- a/slides/Week3_Recap.pptx
+++ b/slides/Week3_Recap.pptx
@@ -188,13 +188,404 @@
 <file path=ppt/revisionInfo.xml><?xml version="1.0" encoding="utf-8"?>
 <p1510:revInfo xmlns:a="http://schemas.openxmlformats.org/drawingml/2006/main" xmlns:r="http://schemas.openxmlformats.org/officeDocument/2006/relationships" xmlns:p1510="http://schemas.microsoft.com/office/powerpoint/2015/10/main">
   <p1510:revLst>
-    <p1510:client id="{7192535B-B12F-4394-AD53-7A663D090977}" v="458" dt="2024-01-31T05:24:44.143"/>
+    <p1510:client id="{5F157F27-C097-42F3-BA4E-21E2C68F73F1}" v="2" dt="2024-02-01T09:40:59.151"/>
   </p1510:revLst>
 </p1510:revInfo>
 </file>
 
 <file path=ppt/changesInfos/changesInfo1.xml><?xml version="1.0" encoding="utf-8"?>
 <pc:chgInfo xmlns:a="http://schemas.openxmlformats.org/drawingml/2006/main" xmlns:r="http://schemas.openxmlformats.org/officeDocument/2006/relationships" xmlns:ac="http://schemas.microsoft.com/office/drawing/2013/main/command" xmlns:pc="http://schemas.microsoft.com/office/powerpoint/2013/main/command">
+  <pc:docChgLst>
+    <pc:chgData name="Zhao Jin" userId="cd05a825-544c-438a-9ba1-08e63db50b47" providerId="ADAL" clId="{5F157F27-C097-42F3-BA4E-21E2C68F73F1}"/>
+    <pc:docChg chg="undo custSel modSld modMainMaster">
+      <pc:chgData name="Zhao Jin" userId="cd05a825-544c-438a-9ba1-08e63db50b47" providerId="ADAL" clId="{5F157F27-C097-42F3-BA4E-21E2C68F73F1}" dt="2024-02-01T09:41:20.183" v="5" actId="255"/>
+      <pc:docMkLst>
+        <pc:docMk/>
+      </pc:docMkLst>
+      <pc:sldChg chg="modSp mod">
+        <pc:chgData name="Zhao Jin" userId="cd05a825-544c-438a-9ba1-08e63db50b47" providerId="ADAL" clId="{5F157F27-C097-42F3-BA4E-21E2C68F73F1}" dt="2024-02-01T09:41:14.742" v="4" actId="255"/>
+        <pc:sldMkLst>
+          <pc:docMk/>
+          <pc:sldMk cId="1492339910" sldId="485"/>
+        </pc:sldMkLst>
+        <pc:spChg chg="mod">
+          <ac:chgData name="Zhao Jin" userId="cd05a825-544c-438a-9ba1-08e63db50b47" providerId="ADAL" clId="{5F157F27-C097-42F3-BA4E-21E2C68F73F1}" dt="2024-02-01T09:41:14.742" v="4" actId="255"/>
+          <ac:spMkLst>
+            <pc:docMk/>
+            <pc:sldMk cId="1492339910" sldId="485"/>
+            <ac:spMk id="3" creationId="{D017A1AE-BBBE-B98F-9018-E181003043DD}"/>
+          </ac:spMkLst>
+        </pc:spChg>
+      </pc:sldChg>
+      <pc:sldChg chg="modSp mod">
+        <pc:chgData name="Zhao Jin" userId="cd05a825-544c-438a-9ba1-08e63db50b47" providerId="ADAL" clId="{5F157F27-C097-42F3-BA4E-21E2C68F73F1}" dt="2024-02-01T09:41:20.183" v="5" actId="255"/>
+        <pc:sldMkLst>
+          <pc:docMk/>
+          <pc:sldMk cId="4078418712" sldId="525"/>
+        </pc:sldMkLst>
+        <pc:spChg chg="mod">
+          <ac:chgData name="Zhao Jin" userId="cd05a825-544c-438a-9ba1-08e63db50b47" providerId="ADAL" clId="{5F157F27-C097-42F3-BA4E-21E2C68F73F1}" dt="2024-02-01T09:41:20.183" v="5" actId="255"/>
+          <ac:spMkLst>
+            <pc:docMk/>
+            <pc:sldMk cId="4078418712" sldId="525"/>
+            <ac:spMk id="3" creationId="{6DF0351F-7FE6-CE3F-FB41-2216C50ED54D}"/>
+          </ac:spMkLst>
+        </pc:spChg>
+      </pc:sldChg>
+      <pc:sldChg chg="modSp">
+        <pc:chgData name="Zhao Jin" userId="cd05a825-544c-438a-9ba1-08e63db50b47" providerId="ADAL" clId="{5F157F27-C097-42F3-BA4E-21E2C68F73F1}" dt="2024-02-01T09:40:59.151" v="3"/>
+        <pc:sldMkLst>
+          <pc:docMk/>
+          <pc:sldMk cId="681224785" sldId="531"/>
+        </pc:sldMkLst>
+        <pc:spChg chg="mod">
+          <ac:chgData name="Zhao Jin" userId="cd05a825-544c-438a-9ba1-08e63db50b47" providerId="ADAL" clId="{5F157F27-C097-42F3-BA4E-21E2C68F73F1}" dt="2024-02-01T09:40:59.151" v="3"/>
+          <ac:spMkLst>
+            <pc:docMk/>
+            <pc:sldMk cId="681224785" sldId="531"/>
+            <ac:spMk id="5" creationId="{C71938E5-94E3-A7B4-982C-77880F377DE2}"/>
+          </ac:spMkLst>
+        </pc:spChg>
+      </pc:sldChg>
+      <pc:sldChg chg="modSp">
+        <pc:chgData name="Zhao Jin" userId="cd05a825-544c-438a-9ba1-08e63db50b47" providerId="ADAL" clId="{5F157F27-C097-42F3-BA4E-21E2C68F73F1}" dt="2024-02-01T09:40:59.151" v="3"/>
+        <pc:sldMkLst>
+          <pc:docMk/>
+          <pc:sldMk cId="3949125736" sldId="548"/>
+        </pc:sldMkLst>
+        <pc:spChg chg="mod">
+          <ac:chgData name="Zhao Jin" userId="cd05a825-544c-438a-9ba1-08e63db50b47" providerId="ADAL" clId="{5F157F27-C097-42F3-BA4E-21E2C68F73F1}" dt="2024-02-01T09:40:59.151" v="3"/>
+          <ac:spMkLst>
+            <pc:docMk/>
+            <pc:sldMk cId="3949125736" sldId="548"/>
+            <ac:spMk id="3" creationId="{9C100D60-340C-73E3-2BF1-03764A1993DA}"/>
+          </ac:spMkLst>
+        </pc:spChg>
+      </pc:sldChg>
+      <pc:sldChg chg="modSp">
+        <pc:chgData name="Zhao Jin" userId="cd05a825-544c-438a-9ba1-08e63db50b47" providerId="ADAL" clId="{5F157F27-C097-42F3-BA4E-21E2C68F73F1}" dt="2024-02-01T09:40:59.151" v="3"/>
+        <pc:sldMkLst>
+          <pc:docMk/>
+          <pc:sldMk cId="2939077141" sldId="549"/>
+        </pc:sldMkLst>
+        <pc:spChg chg="mod">
+          <ac:chgData name="Zhao Jin" userId="cd05a825-544c-438a-9ba1-08e63db50b47" providerId="ADAL" clId="{5F157F27-C097-42F3-BA4E-21E2C68F73F1}" dt="2024-02-01T09:40:59.151" v="3"/>
+          <ac:spMkLst>
+            <pc:docMk/>
+            <pc:sldMk cId="2939077141" sldId="549"/>
+            <ac:spMk id="3" creationId="{E973F187-712C-97AB-366C-17C2AB5FA29D}"/>
+          </ac:spMkLst>
+        </pc:spChg>
+      </pc:sldChg>
+      <pc:sldChg chg="modSp">
+        <pc:chgData name="Zhao Jin" userId="cd05a825-544c-438a-9ba1-08e63db50b47" providerId="ADAL" clId="{5F157F27-C097-42F3-BA4E-21E2C68F73F1}" dt="2024-02-01T09:40:59.151" v="3"/>
+        <pc:sldMkLst>
+          <pc:docMk/>
+          <pc:sldMk cId="4227920544" sldId="550"/>
+        </pc:sldMkLst>
+        <pc:spChg chg="mod">
+          <ac:chgData name="Zhao Jin" userId="cd05a825-544c-438a-9ba1-08e63db50b47" providerId="ADAL" clId="{5F157F27-C097-42F3-BA4E-21E2C68F73F1}" dt="2024-02-01T09:40:59.151" v="3"/>
+          <ac:spMkLst>
+            <pc:docMk/>
+            <pc:sldMk cId="4227920544" sldId="550"/>
+            <ac:spMk id="6" creationId="{60DC6E70-8CA7-DFA4-338E-89568A6E19A6}"/>
+          </ac:spMkLst>
+        </pc:spChg>
+      </pc:sldChg>
+      <pc:sldChg chg="modSp mod">
+        <pc:chgData name="Zhao Jin" userId="cd05a825-544c-438a-9ba1-08e63db50b47" providerId="ADAL" clId="{5F157F27-C097-42F3-BA4E-21E2C68F73F1}" dt="2024-02-01T09:40:59.151" v="3"/>
+        <pc:sldMkLst>
+          <pc:docMk/>
+          <pc:sldMk cId="3404136433" sldId="551"/>
+        </pc:sldMkLst>
+        <pc:spChg chg="mod">
+          <ac:chgData name="Zhao Jin" userId="cd05a825-544c-438a-9ba1-08e63db50b47" providerId="ADAL" clId="{5F157F27-C097-42F3-BA4E-21E2C68F73F1}" dt="2024-02-01T09:40:59.151" v="3"/>
+          <ac:spMkLst>
+            <pc:docMk/>
+            <pc:sldMk cId="3404136433" sldId="551"/>
+            <ac:spMk id="5" creationId="{5A1D4A4D-7C1F-22A2-9FFC-F79C2D0FF241}"/>
+          </ac:spMkLst>
+        </pc:spChg>
+      </pc:sldChg>
+      <pc:sldChg chg="modSp">
+        <pc:chgData name="Zhao Jin" userId="cd05a825-544c-438a-9ba1-08e63db50b47" providerId="ADAL" clId="{5F157F27-C097-42F3-BA4E-21E2C68F73F1}" dt="2024-02-01T09:40:59.151" v="3"/>
+        <pc:sldMkLst>
+          <pc:docMk/>
+          <pc:sldMk cId="1146460544" sldId="552"/>
+        </pc:sldMkLst>
+        <pc:spChg chg="mod">
+          <ac:chgData name="Zhao Jin" userId="cd05a825-544c-438a-9ba1-08e63db50b47" providerId="ADAL" clId="{5F157F27-C097-42F3-BA4E-21E2C68F73F1}" dt="2024-02-01T09:40:59.151" v="3"/>
+          <ac:spMkLst>
+            <pc:docMk/>
+            <pc:sldMk cId="1146460544" sldId="552"/>
+            <ac:spMk id="3" creationId="{3E095A78-BE48-028F-6AA9-089A366CA9B3}"/>
+          </ac:spMkLst>
+        </pc:spChg>
+      </pc:sldChg>
+      <pc:sldChg chg="modSp">
+        <pc:chgData name="Zhao Jin" userId="cd05a825-544c-438a-9ba1-08e63db50b47" providerId="ADAL" clId="{5F157F27-C097-42F3-BA4E-21E2C68F73F1}" dt="2024-02-01T09:40:59.151" v="3"/>
+        <pc:sldMkLst>
+          <pc:docMk/>
+          <pc:sldMk cId="222951515" sldId="553"/>
+        </pc:sldMkLst>
+        <pc:spChg chg="mod">
+          <ac:chgData name="Zhao Jin" userId="cd05a825-544c-438a-9ba1-08e63db50b47" providerId="ADAL" clId="{5F157F27-C097-42F3-BA4E-21E2C68F73F1}" dt="2024-02-01T09:40:59.151" v="3"/>
+          <ac:spMkLst>
+            <pc:docMk/>
+            <pc:sldMk cId="222951515" sldId="553"/>
+            <ac:spMk id="3" creationId="{2289870A-E99C-0D18-B0C9-82800E2E917F}"/>
+          </ac:spMkLst>
+        </pc:spChg>
+      </pc:sldChg>
+      <pc:sldChg chg="modSp">
+        <pc:chgData name="Zhao Jin" userId="cd05a825-544c-438a-9ba1-08e63db50b47" providerId="ADAL" clId="{5F157F27-C097-42F3-BA4E-21E2C68F73F1}" dt="2024-02-01T09:40:59.151" v="3"/>
+        <pc:sldMkLst>
+          <pc:docMk/>
+          <pc:sldMk cId="2043253325" sldId="557"/>
+        </pc:sldMkLst>
+        <pc:spChg chg="mod">
+          <ac:chgData name="Zhao Jin" userId="cd05a825-544c-438a-9ba1-08e63db50b47" providerId="ADAL" clId="{5F157F27-C097-42F3-BA4E-21E2C68F73F1}" dt="2024-02-01T09:40:59.151" v="3"/>
+          <ac:spMkLst>
+            <pc:docMk/>
+            <pc:sldMk cId="2043253325" sldId="557"/>
+            <ac:spMk id="3" creationId="{E0342226-2BC1-78AC-E599-2D6DEFCF035F}"/>
+          </ac:spMkLst>
+        </pc:spChg>
+      </pc:sldChg>
+      <pc:sldChg chg="modSp">
+        <pc:chgData name="Zhao Jin" userId="cd05a825-544c-438a-9ba1-08e63db50b47" providerId="ADAL" clId="{5F157F27-C097-42F3-BA4E-21E2C68F73F1}" dt="2024-02-01T09:40:59.151" v="3"/>
+        <pc:sldMkLst>
+          <pc:docMk/>
+          <pc:sldMk cId="2893852573" sldId="558"/>
+        </pc:sldMkLst>
+        <pc:spChg chg="mod">
+          <ac:chgData name="Zhao Jin" userId="cd05a825-544c-438a-9ba1-08e63db50b47" providerId="ADAL" clId="{5F157F27-C097-42F3-BA4E-21E2C68F73F1}" dt="2024-02-01T09:40:59.151" v="3"/>
+          <ac:spMkLst>
+            <pc:docMk/>
+            <pc:sldMk cId="2893852573" sldId="558"/>
+            <ac:spMk id="3" creationId="{09F88C8D-5209-DD3B-6295-FA770574942C}"/>
+          </ac:spMkLst>
+        </pc:spChg>
+      </pc:sldChg>
+      <pc:sldChg chg="modSp">
+        <pc:chgData name="Zhao Jin" userId="cd05a825-544c-438a-9ba1-08e63db50b47" providerId="ADAL" clId="{5F157F27-C097-42F3-BA4E-21E2C68F73F1}" dt="2024-02-01T09:40:59.151" v="3"/>
+        <pc:sldMkLst>
+          <pc:docMk/>
+          <pc:sldMk cId="2199886267" sldId="559"/>
+        </pc:sldMkLst>
+        <pc:spChg chg="mod">
+          <ac:chgData name="Zhao Jin" userId="cd05a825-544c-438a-9ba1-08e63db50b47" providerId="ADAL" clId="{5F157F27-C097-42F3-BA4E-21E2C68F73F1}" dt="2024-02-01T09:40:59.151" v="3"/>
+          <ac:spMkLst>
+            <pc:docMk/>
+            <pc:sldMk cId="2199886267" sldId="559"/>
+            <ac:spMk id="3" creationId="{839B742B-D417-507B-876A-D13E628C61E3}"/>
+          </ac:spMkLst>
+        </pc:spChg>
+      </pc:sldChg>
+      <pc:sldMasterChg chg="modSp modSldLayout">
+        <pc:chgData name="Zhao Jin" userId="cd05a825-544c-438a-9ba1-08e63db50b47" providerId="ADAL" clId="{5F157F27-C097-42F3-BA4E-21E2C68F73F1}" dt="2024-02-01T09:40:59.151" v="3"/>
+        <pc:sldMasterMkLst>
+          <pc:docMk/>
+          <pc:sldMasterMk cId="0" sldId="2147485087"/>
+        </pc:sldMasterMkLst>
+        <pc:spChg chg="mod">
+          <ac:chgData name="Zhao Jin" userId="cd05a825-544c-438a-9ba1-08e63db50b47" providerId="ADAL" clId="{5F157F27-C097-42F3-BA4E-21E2C68F73F1}" dt="2024-02-01T09:40:59.151" v="3"/>
+          <ac:spMkLst>
+            <pc:docMk/>
+            <pc:sldMasterMk cId="0" sldId="2147485087"/>
+            <ac:spMk id="6" creationId="{00000000-0000-0000-0000-000000000000}"/>
+          </ac:spMkLst>
+        </pc:spChg>
+        <pc:sldLayoutChg chg="modSp">
+          <pc:chgData name="Zhao Jin" userId="cd05a825-544c-438a-9ba1-08e63db50b47" providerId="ADAL" clId="{5F157F27-C097-42F3-BA4E-21E2C68F73F1}" dt="2024-02-01T09:40:59.151" v="3"/>
+          <pc:sldLayoutMkLst>
+            <pc:docMk/>
+            <pc:sldMasterMk cId="0" sldId="2147485087"/>
+            <pc:sldLayoutMk cId="0" sldId="2147485088"/>
+          </pc:sldLayoutMkLst>
+          <pc:spChg chg="mod">
+            <ac:chgData name="Zhao Jin" userId="cd05a825-544c-438a-9ba1-08e63db50b47" providerId="ADAL" clId="{5F157F27-C097-42F3-BA4E-21E2C68F73F1}" dt="2024-02-01T09:40:59.151" v="3"/>
+            <ac:spMkLst>
+              <pc:docMk/>
+              <pc:sldMasterMk cId="0" sldId="2147485087"/>
+              <pc:sldLayoutMk cId="0" sldId="2147485088"/>
+              <ac:spMk id="6" creationId="{00000000-0000-0000-0000-000000000000}"/>
+            </ac:spMkLst>
+          </pc:spChg>
+        </pc:sldLayoutChg>
+        <pc:sldLayoutChg chg="modSp">
+          <pc:chgData name="Zhao Jin" userId="cd05a825-544c-438a-9ba1-08e63db50b47" providerId="ADAL" clId="{5F157F27-C097-42F3-BA4E-21E2C68F73F1}" dt="2024-02-01T09:40:59.151" v="3"/>
+          <pc:sldLayoutMkLst>
+            <pc:docMk/>
+            <pc:sldMasterMk cId="0" sldId="2147485087"/>
+            <pc:sldLayoutMk cId="0" sldId="2147485089"/>
+          </pc:sldLayoutMkLst>
+          <pc:spChg chg="mod">
+            <ac:chgData name="Zhao Jin" userId="cd05a825-544c-438a-9ba1-08e63db50b47" providerId="ADAL" clId="{5F157F27-C097-42F3-BA4E-21E2C68F73F1}" dt="2024-02-01T09:40:59.151" v="3"/>
+            <ac:spMkLst>
+              <pc:docMk/>
+              <pc:sldMasterMk cId="0" sldId="2147485087"/>
+              <pc:sldLayoutMk cId="0" sldId="2147485089"/>
+              <ac:spMk id="6" creationId="{00000000-0000-0000-0000-000000000000}"/>
+            </ac:spMkLst>
+          </pc:spChg>
+        </pc:sldLayoutChg>
+        <pc:sldLayoutChg chg="modSp">
+          <pc:chgData name="Zhao Jin" userId="cd05a825-544c-438a-9ba1-08e63db50b47" providerId="ADAL" clId="{5F157F27-C097-42F3-BA4E-21E2C68F73F1}" dt="2024-02-01T09:40:59.151" v="3"/>
+          <pc:sldLayoutMkLst>
+            <pc:docMk/>
+            <pc:sldMasterMk cId="0" sldId="2147485087"/>
+            <pc:sldLayoutMk cId="0" sldId="2147485090"/>
+          </pc:sldLayoutMkLst>
+          <pc:spChg chg="mod">
+            <ac:chgData name="Zhao Jin" userId="cd05a825-544c-438a-9ba1-08e63db50b47" providerId="ADAL" clId="{5F157F27-C097-42F3-BA4E-21E2C68F73F1}" dt="2024-02-01T09:40:59.151" v="3"/>
+            <ac:spMkLst>
+              <pc:docMk/>
+              <pc:sldMasterMk cId="0" sldId="2147485087"/>
+              <pc:sldLayoutMk cId="0" sldId="2147485090"/>
+              <ac:spMk id="6" creationId="{00000000-0000-0000-0000-000000000000}"/>
+            </ac:spMkLst>
+          </pc:spChg>
+        </pc:sldLayoutChg>
+        <pc:sldLayoutChg chg="modSp">
+          <pc:chgData name="Zhao Jin" userId="cd05a825-544c-438a-9ba1-08e63db50b47" providerId="ADAL" clId="{5F157F27-C097-42F3-BA4E-21E2C68F73F1}" dt="2024-02-01T09:40:59.151" v="3"/>
+          <pc:sldLayoutMkLst>
+            <pc:docMk/>
+            <pc:sldMasterMk cId="0" sldId="2147485087"/>
+            <pc:sldLayoutMk cId="0" sldId="2147485091"/>
+          </pc:sldLayoutMkLst>
+          <pc:spChg chg="mod">
+            <ac:chgData name="Zhao Jin" userId="cd05a825-544c-438a-9ba1-08e63db50b47" providerId="ADAL" clId="{5F157F27-C097-42F3-BA4E-21E2C68F73F1}" dt="2024-02-01T09:40:59.151" v="3"/>
+            <ac:spMkLst>
+              <pc:docMk/>
+              <pc:sldMasterMk cId="0" sldId="2147485087"/>
+              <pc:sldLayoutMk cId="0" sldId="2147485091"/>
+              <ac:spMk id="7" creationId="{00000000-0000-0000-0000-000000000000}"/>
+            </ac:spMkLst>
+          </pc:spChg>
+        </pc:sldLayoutChg>
+        <pc:sldLayoutChg chg="modSp">
+          <pc:chgData name="Zhao Jin" userId="cd05a825-544c-438a-9ba1-08e63db50b47" providerId="ADAL" clId="{5F157F27-C097-42F3-BA4E-21E2C68F73F1}" dt="2024-02-01T09:40:59.151" v="3"/>
+          <pc:sldLayoutMkLst>
+            <pc:docMk/>
+            <pc:sldMasterMk cId="0" sldId="2147485087"/>
+            <pc:sldLayoutMk cId="0" sldId="2147485092"/>
+          </pc:sldLayoutMkLst>
+          <pc:spChg chg="mod">
+            <ac:chgData name="Zhao Jin" userId="cd05a825-544c-438a-9ba1-08e63db50b47" providerId="ADAL" clId="{5F157F27-C097-42F3-BA4E-21E2C68F73F1}" dt="2024-02-01T09:40:59.151" v="3"/>
+            <ac:spMkLst>
+              <pc:docMk/>
+              <pc:sldMasterMk cId="0" sldId="2147485087"/>
+              <pc:sldLayoutMk cId="0" sldId="2147485092"/>
+              <ac:spMk id="9" creationId="{00000000-0000-0000-0000-000000000000}"/>
+            </ac:spMkLst>
+          </pc:spChg>
+        </pc:sldLayoutChg>
+        <pc:sldLayoutChg chg="modSp">
+          <pc:chgData name="Zhao Jin" userId="cd05a825-544c-438a-9ba1-08e63db50b47" providerId="ADAL" clId="{5F157F27-C097-42F3-BA4E-21E2C68F73F1}" dt="2024-02-01T09:40:59.151" v="3"/>
+          <pc:sldLayoutMkLst>
+            <pc:docMk/>
+            <pc:sldMasterMk cId="0" sldId="2147485087"/>
+            <pc:sldLayoutMk cId="0" sldId="2147485093"/>
+          </pc:sldLayoutMkLst>
+          <pc:spChg chg="mod">
+            <ac:chgData name="Zhao Jin" userId="cd05a825-544c-438a-9ba1-08e63db50b47" providerId="ADAL" clId="{5F157F27-C097-42F3-BA4E-21E2C68F73F1}" dt="2024-02-01T09:40:59.151" v="3"/>
+            <ac:spMkLst>
+              <pc:docMk/>
+              <pc:sldMasterMk cId="0" sldId="2147485087"/>
+              <pc:sldLayoutMk cId="0" sldId="2147485093"/>
+              <ac:spMk id="5" creationId="{00000000-0000-0000-0000-000000000000}"/>
+            </ac:spMkLst>
+          </pc:spChg>
+        </pc:sldLayoutChg>
+        <pc:sldLayoutChg chg="modSp">
+          <pc:chgData name="Zhao Jin" userId="cd05a825-544c-438a-9ba1-08e63db50b47" providerId="ADAL" clId="{5F157F27-C097-42F3-BA4E-21E2C68F73F1}" dt="2024-02-01T09:40:59.151" v="3"/>
+          <pc:sldLayoutMkLst>
+            <pc:docMk/>
+            <pc:sldMasterMk cId="0" sldId="2147485087"/>
+            <pc:sldLayoutMk cId="0" sldId="2147485094"/>
+          </pc:sldLayoutMkLst>
+          <pc:spChg chg="mod">
+            <ac:chgData name="Zhao Jin" userId="cd05a825-544c-438a-9ba1-08e63db50b47" providerId="ADAL" clId="{5F157F27-C097-42F3-BA4E-21E2C68F73F1}" dt="2024-02-01T09:40:59.151" v="3"/>
+            <ac:spMkLst>
+              <pc:docMk/>
+              <pc:sldMasterMk cId="0" sldId="2147485087"/>
+              <pc:sldLayoutMk cId="0" sldId="2147485094"/>
+              <ac:spMk id="4" creationId="{00000000-0000-0000-0000-000000000000}"/>
+            </ac:spMkLst>
+          </pc:spChg>
+        </pc:sldLayoutChg>
+        <pc:sldLayoutChg chg="modSp">
+          <pc:chgData name="Zhao Jin" userId="cd05a825-544c-438a-9ba1-08e63db50b47" providerId="ADAL" clId="{5F157F27-C097-42F3-BA4E-21E2C68F73F1}" dt="2024-02-01T09:40:59.151" v="3"/>
+          <pc:sldLayoutMkLst>
+            <pc:docMk/>
+            <pc:sldMasterMk cId="0" sldId="2147485087"/>
+            <pc:sldLayoutMk cId="0" sldId="2147485095"/>
+          </pc:sldLayoutMkLst>
+          <pc:spChg chg="mod">
+            <ac:chgData name="Zhao Jin" userId="cd05a825-544c-438a-9ba1-08e63db50b47" providerId="ADAL" clId="{5F157F27-C097-42F3-BA4E-21E2C68F73F1}" dt="2024-02-01T09:40:59.151" v="3"/>
+            <ac:spMkLst>
+              <pc:docMk/>
+              <pc:sldMasterMk cId="0" sldId="2147485087"/>
+              <pc:sldLayoutMk cId="0" sldId="2147485095"/>
+              <ac:spMk id="7" creationId="{00000000-0000-0000-0000-000000000000}"/>
+            </ac:spMkLst>
+          </pc:spChg>
+        </pc:sldLayoutChg>
+        <pc:sldLayoutChg chg="modSp">
+          <pc:chgData name="Zhao Jin" userId="cd05a825-544c-438a-9ba1-08e63db50b47" providerId="ADAL" clId="{5F157F27-C097-42F3-BA4E-21E2C68F73F1}" dt="2024-02-01T09:40:59.151" v="3"/>
+          <pc:sldLayoutMkLst>
+            <pc:docMk/>
+            <pc:sldMasterMk cId="0" sldId="2147485087"/>
+            <pc:sldLayoutMk cId="0" sldId="2147485096"/>
+          </pc:sldLayoutMkLst>
+          <pc:spChg chg="mod">
+            <ac:chgData name="Zhao Jin" userId="cd05a825-544c-438a-9ba1-08e63db50b47" providerId="ADAL" clId="{5F157F27-C097-42F3-BA4E-21E2C68F73F1}" dt="2024-02-01T09:40:59.151" v="3"/>
+            <ac:spMkLst>
+              <pc:docMk/>
+              <pc:sldMasterMk cId="0" sldId="2147485087"/>
+              <pc:sldLayoutMk cId="0" sldId="2147485096"/>
+              <ac:spMk id="7" creationId="{00000000-0000-0000-0000-000000000000}"/>
+            </ac:spMkLst>
+          </pc:spChg>
+        </pc:sldLayoutChg>
+        <pc:sldLayoutChg chg="modSp">
+          <pc:chgData name="Zhao Jin" userId="cd05a825-544c-438a-9ba1-08e63db50b47" providerId="ADAL" clId="{5F157F27-C097-42F3-BA4E-21E2C68F73F1}" dt="2024-02-01T09:40:59.151" v="3"/>
+          <pc:sldLayoutMkLst>
+            <pc:docMk/>
+            <pc:sldMasterMk cId="0" sldId="2147485087"/>
+            <pc:sldLayoutMk cId="0" sldId="2147485097"/>
+          </pc:sldLayoutMkLst>
+          <pc:spChg chg="mod">
+            <ac:chgData name="Zhao Jin" userId="cd05a825-544c-438a-9ba1-08e63db50b47" providerId="ADAL" clId="{5F157F27-C097-42F3-BA4E-21E2C68F73F1}" dt="2024-02-01T09:40:59.151" v="3"/>
+            <ac:spMkLst>
+              <pc:docMk/>
+              <pc:sldMasterMk cId="0" sldId="2147485087"/>
+              <pc:sldLayoutMk cId="0" sldId="2147485097"/>
+              <ac:spMk id="6" creationId="{00000000-0000-0000-0000-000000000000}"/>
+            </ac:spMkLst>
+          </pc:spChg>
+        </pc:sldLayoutChg>
+        <pc:sldLayoutChg chg="modSp">
+          <pc:chgData name="Zhao Jin" userId="cd05a825-544c-438a-9ba1-08e63db50b47" providerId="ADAL" clId="{5F157F27-C097-42F3-BA4E-21E2C68F73F1}" dt="2024-02-01T09:40:59.151" v="3"/>
+          <pc:sldLayoutMkLst>
+            <pc:docMk/>
+            <pc:sldMasterMk cId="0" sldId="2147485087"/>
+            <pc:sldLayoutMk cId="0" sldId="2147485098"/>
+          </pc:sldLayoutMkLst>
+          <pc:spChg chg="mod">
+            <ac:chgData name="Zhao Jin" userId="cd05a825-544c-438a-9ba1-08e63db50b47" providerId="ADAL" clId="{5F157F27-C097-42F3-BA4E-21E2C68F73F1}" dt="2024-02-01T09:40:59.151" v="3"/>
+            <ac:spMkLst>
+              <pc:docMk/>
+              <pc:sldMasterMk cId="0" sldId="2147485087"/>
+              <pc:sldLayoutMk cId="0" sldId="2147485098"/>
+              <ac:spMk id="6" creationId="{00000000-0000-0000-0000-000000000000}"/>
+            </ac:spMkLst>
+          </pc:spChg>
+        </pc:sldLayoutChg>
+      </pc:sldMasterChg>
+    </pc:docChg>
+  </pc:docChgLst>
   <pc:docChgLst>
     <pc:chgData name="Zhao Jin" userId="cd05a825-544c-438a-9ba1-08e63db50b47" providerId="ADAL" clId="{40B02829-7445-394A-990C-032942059FD9}"/>
     <pc:docChg chg="custSel modSld">
@@ -2307,7 +2698,7 @@
               <a:pPr>
                 <a:defRPr/>
               </a:pPr>
-              <a:t>1/31/2024</a:t>
+              <a:t>2/1/2024</a:t>
             </a:fld>
             <a:endParaRPr lang="en-US"/>
           </a:p>
@@ -4284,7 +4675,7 @@
             </a:pPr>
             <a:r>
               <a:rPr lang="en-US" dirty="0"/>
-              <a:t>Week2 - </a:t>
+              <a:t>Week3R - </a:t>
             </a:r>
             <a:fld id="{2E4790E1-2590-4AEE-892D-AB46A7688113}" type="slidenum">
               <a:rPr lang="en-US" smtClean="0"/>
@@ -4505,7 +4896,7 @@
             </a:pPr>
             <a:r>
               <a:rPr lang="en-US" dirty="0"/>
-              <a:t>Week2 - </a:t>
+              <a:t>Week3R - </a:t>
             </a:r>
             <a:fld id="{2E4790E1-2590-4AEE-892D-AB46A7688113}" type="slidenum">
               <a:rPr lang="en-US" smtClean="0"/>
@@ -4703,7 +5094,7 @@
             </a:pPr>
             <a:r>
               <a:rPr lang="en-US" dirty="0"/>
-              <a:t>Week2 - </a:t>
+              <a:t>Week3R - </a:t>
             </a:r>
             <a:fld id="{2E4790E1-2590-4AEE-892D-AB46A7688113}" type="slidenum">
               <a:rPr lang="en-US" smtClean="0"/>
@@ -4893,7 +5284,7 @@
             </a:pPr>
             <a:r>
               <a:rPr lang="en-US" dirty="0"/>
-              <a:t>Week2 - </a:t>
+              <a:t>Week3R - </a:t>
             </a:r>
             <a:fld id="{2E4790E1-2590-4AEE-892D-AB46A7688113}" type="slidenum">
               <a:rPr lang="en-US" smtClean="0"/>
@@ -5168,7 +5559,7 @@
             </a:pPr>
             <a:r>
               <a:rPr lang="en-US" dirty="0"/>
-              <a:t>Week2 - </a:t>
+              <a:t>Week3R - </a:t>
             </a:r>
             <a:fld id="{2E4790E1-2590-4AEE-892D-AB46A7688113}" type="slidenum">
               <a:rPr lang="en-US" smtClean="0"/>
@@ -5508,7 +5899,7 @@
             </a:pPr>
             <a:r>
               <a:rPr lang="en-US" dirty="0"/>
-              <a:t>Week2 - </a:t>
+              <a:t>Week3R - </a:t>
             </a:r>
             <a:fld id="{2E4790E1-2590-4AEE-892D-AB46A7688113}" type="slidenum">
               <a:rPr lang="en-US" smtClean="0"/>
@@ -5997,7 +6388,7 @@
             </a:pPr>
             <a:r>
               <a:rPr lang="en-US" dirty="0"/>
-              <a:t>Week2 - </a:t>
+              <a:t>Week3R - </a:t>
             </a:r>
             <a:fld id="{2E4790E1-2590-4AEE-892D-AB46A7688113}" type="slidenum">
               <a:rPr lang="en-US" smtClean="0"/>
@@ -6167,7 +6558,7 @@
             </a:pPr>
             <a:r>
               <a:rPr lang="en-US" dirty="0"/>
-              <a:t>Week2 - </a:t>
+              <a:t>Week3R - </a:t>
             </a:r>
             <a:fld id="{2E4790E1-2590-4AEE-892D-AB46A7688113}" type="slidenum">
               <a:rPr lang="en-US" smtClean="0"/>
@@ -6280,7 +6671,7 @@
             </a:pPr>
             <a:r>
               <a:rPr lang="en-US" dirty="0"/>
-              <a:t>Week2 - </a:t>
+              <a:t>Week3R - </a:t>
             </a:r>
             <a:fld id="{2E4790E1-2590-4AEE-892D-AB46A7688113}" type="slidenum">
               <a:rPr lang="en-US" smtClean="0"/>
@@ -6577,7 +6968,7 @@
             </a:pPr>
             <a:r>
               <a:rPr lang="en-US" dirty="0"/>
-              <a:t>Week2 - </a:t>
+              <a:t>Week3R - </a:t>
             </a:r>
             <a:fld id="{2E4790E1-2590-4AEE-892D-AB46A7688113}" type="slidenum">
               <a:rPr lang="en-US" smtClean="0"/>
@@ -6905,7 +7296,7 @@
             </a:pPr>
             <a:r>
               <a:rPr lang="en-US" dirty="0"/>
-              <a:t>Week2 - </a:t>
+              <a:t>Week3R - </a:t>
             </a:r>
             <a:fld id="{2E4790E1-2590-4AEE-892D-AB46A7688113}" type="slidenum">
               <a:rPr lang="en-US" smtClean="0"/>
@@ -7257,7 +7648,7 @@
             </a:pPr>
             <a:r>
               <a:rPr lang="en-US" dirty="0"/>
-              <a:t>Week2 - </a:t>
+              <a:t>Week3R - </a:t>
             </a:r>
             <a:fld id="{2E4790E1-2590-4AEE-892D-AB46A7688113}" type="slidenum">
               <a:rPr lang="en-US" smtClean="0"/>
@@ -7289,7 +7680,7 @@
   <p:transition>
     <p:fade/>
   </p:transition>
-  <p:hf sldNum="0" hdr="0" dt="0"/>
+  <p:hf hdr="0" dt="0"/>
   <p:txStyles>
     <p:titleStyle>
       <a:lvl1pPr algn="l" defTabSz="914400" rtl="0" eaLnBrk="1" latinLnBrk="0" hangingPunct="1">
@@ -8612,6 +9003,45 @@
           </a:p>
         </p:txBody>
       </p:sp>
+      <p:sp>
+        <p:nvSpPr>
+          <p:cNvPr id="3" name="Slide Number Placeholder 2">
+            <a:extLst>
+              <a:ext uri="{FF2B5EF4-FFF2-40B4-BE49-F238E27FC236}">
+                <a16:creationId xmlns:a16="http://schemas.microsoft.com/office/drawing/2014/main" id="{09F88C8D-5209-DD3B-6295-FA770574942C}"/>
+              </a:ext>
+            </a:extLst>
+          </p:cNvPr>
+          <p:cNvSpPr>
+            <a:spLocks noGrp="1"/>
+          </p:cNvSpPr>
+          <p:nvPr>
+            <p:ph type="sldNum" sz="quarter" idx="12"/>
+          </p:nvPr>
+        </p:nvSpPr>
+        <p:spPr/>
+        <p:txBody>
+          <a:bodyPr/>
+          <a:lstStyle/>
+          <a:p>
+            <a:pPr>
+              <a:defRPr/>
+            </a:pPr>
+            <a:r>
+              <a:rPr lang="en-US" dirty="0"/>
+              <a:t>Week3R - </a:t>
+            </a:r>
+            <a:fld id="{2E4790E1-2590-4AEE-892D-AB46A7688113}" type="slidenum">
+              <a:rPr lang="en-US" smtClean="0"/>
+              <a:pPr>
+                <a:defRPr/>
+              </a:pPr>
+              <a:t>10</a:t>
+            </a:fld>
+            <a:endParaRPr lang="en-US" dirty="0"/>
+          </a:p>
+        </p:txBody>
+      </p:sp>
     </p:spTree>
     <p:extLst>
       <p:ext uri="{BB962C8B-B14F-4D97-AF65-F5344CB8AC3E}">
@@ -9537,6 +9967,45 @@
               <a:rPr lang="en-US"/>
               <a:t>CS1010 (AY2023/24 Semester 2)</a:t>
             </a:r>
+            <a:endParaRPr lang="en-US" dirty="0"/>
+          </a:p>
+        </p:txBody>
+      </p:sp>
+      <p:sp>
+        <p:nvSpPr>
+          <p:cNvPr id="3" name="Slide Number Placeholder 2">
+            <a:extLst>
+              <a:ext uri="{FF2B5EF4-FFF2-40B4-BE49-F238E27FC236}">
+                <a16:creationId xmlns:a16="http://schemas.microsoft.com/office/drawing/2014/main" id="{839B742B-D417-507B-876A-D13E628C61E3}"/>
+              </a:ext>
+            </a:extLst>
+          </p:cNvPr>
+          <p:cNvSpPr>
+            <a:spLocks noGrp="1"/>
+          </p:cNvSpPr>
+          <p:nvPr>
+            <p:ph type="sldNum" sz="quarter" idx="12"/>
+          </p:nvPr>
+        </p:nvSpPr>
+        <p:spPr/>
+        <p:txBody>
+          <a:bodyPr/>
+          <a:lstStyle/>
+          <a:p>
+            <a:pPr>
+              <a:defRPr/>
+            </a:pPr>
+            <a:r>
+              <a:rPr lang="en-US" dirty="0"/>
+              <a:t>Week3R - </a:t>
+            </a:r>
+            <a:fld id="{2E4790E1-2590-4AEE-892D-AB46A7688113}" type="slidenum">
+              <a:rPr lang="en-US" smtClean="0"/>
+              <a:pPr>
+                <a:defRPr/>
+              </a:pPr>
+              <a:t>11</a:t>
+            </a:fld>
             <a:endParaRPr lang="en-US" dirty="0"/>
           </a:p>
         </p:txBody>
@@ -10462,6 +10931,45 @@
               <a:t>CS1010 (AY2023/24 Semester 2)</a:t>
             </a:r>
             <a:endParaRPr lang="en-US" dirty="0"/>
+          </a:p>
+        </p:txBody>
+      </p:sp>
+      <p:sp>
+        <p:nvSpPr>
+          <p:cNvPr id="3" name="Slide Number Placeholder 2">
+            <a:extLst>
+              <a:ext uri="{FF2B5EF4-FFF2-40B4-BE49-F238E27FC236}">
+                <a16:creationId xmlns:a16="http://schemas.microsoft.com/office/drawing/2014/main" id="{D017A1AE-BBBE-B98F-9018-E181003043DD}"/>
+              </a:ext>
+            </a:extLst>
+          </p:cNvPr>
+          <p:cNvSpPr>
+            <a:spLocks noGrp="1"/>
+          </p:cNvSpPr>
+          <p:nvPr>
+            <p:ph type="sldNum" sz="quarter" idx="12"/>
+          </p:nvPr>
+        </p:nvSpPr>
+        <p:spPr/>
+        <p:txBody>
+          <a:bodyPr/>
+          <a:lstStyle/>
+          <a:p>
+            <a:pPr>
+              <a:defRPr/>
+            </a:pPr>
+            <a:r>
+              <a:rPr lang="en-US" sz="1100" dirty="0"/>
+              <a:t>Week3R - </a:t>
+            </a:r>
+            <a:fld id="{2E4790E1-2590-4AEE-892D-AB46A7688113}" type="slidenum">
+              <a:rPr lang="en-US" sz="1100" smtClean="0"/>
+              <a:pPr>
+                <a:defRPr/>
+              </a:pPr>
+              <a:t>12</a:t>
+            </a:fld>
+            <a:endParaRPr lang="en-US" sz="1100" dirty="0"/>
           </a:p>
         </p:txBody>
       </p:sp>
@@ -10754,6 +11262,45 @@
           </a:p>
         </p:txBody>
       </p:sp>
+      <p:sp>
+        <p:nvSpPr>
+          <p:cNvPr id="3" name="Slide Number Placeholder 2">
+            <a:extLst>
+              <a:ext uri="{FF2B5EF4-FFF2-40B4-BE49-F238E27FC236}">
+                <a16:creationId xmlns:a16="http://schemas.microsoft.com/office/drawing/2014/main" id="{6DF0351F-7FE6-CE3F-FB41-2216C50ED54D}"/>
+              </a:ext>
+            </a:extLst>
+          </p:cNvPr>
+          <p:cNvSpPr>
+            <a:spLocks noGrp="1"/>
+          </p:cNvSpPr>
+          <p:nvPr>
+            <p:ph type="sldNum" sz="quarter" idx="12"/>
+          </p:nvPr>
+        </p:nvSpPr>
+        <p:spPr/>
+        <p:txBody>
+          <a:bodyPr/>
+          <a:lstStyle/>
+          <a:p>
+            <a:pPr>
+              <a:defRPr/>
+            </a:pPr>
+            <a:r>
+              <a:rPr lang="en-US" sz="1100" dirty="0"/>
+              <a:t>Week3R - </a:t>
+            </a:r>
+            <a:fld id="{2E4790E1-2590-4AEE-892D-AB46A7688113}" type="slidenum">
+              <a:rPr lang="en-US" sz="1100" smtClean="0"/>
+              <a:pPr>
+                <a:defRPr/>
+              </a:pPr>
+              <a:t>13</a:t>
+            </a:fld>
+            <a:endParaRPr lang="en-US" sz="1100" dirty="0"/>
+          </a:p>
+        </p:txBody>
+      </p:sp>
     </p:spTree>
     <p:extLst>
       <p:ext uri="{BB962C8B-B14F-4D97-AF65-F5344CB8AC3E}">
@@ -11646,6 +12193,45 @@
               <a:rPr lang="en-US"/>
               <a:t>CS1010 (AY2023/24 Semester 2)</a:t>
             </a:r>
+            <a:endParaRPr lang="en-US" dirty="0"/>
+          </a:p>
+        </p:txBody>
+      </p:sp>
+      <p:sp>
+        <p:nvSpPr>
+          <p:cNvPr id="6" name="Slide Number Placeholder 5">
+            <a:extLst>
+              <a:ext uri="{FF2B5EF4-FFF2-40B4-BE49-F238E27FC236}">
+                <a16:creationId xmlns:a16="http://schemas.microsoft.com/office/drawing/2014/main" id="{60DC6E70-8CA7-DFA4-338E-89568A6E19A6}"/>
+              </a:ext>
+            </a:extLst>
+          </p:cNvPr>
+          <p:cNvSpPr>
+            <a:spLocks noGrp="1"/>
+          </p:cNvSpPr>
+          <p:nvPr>
+            <p:ph type="sldNum" sz="quarter" idx="12"/>
+          </p:nvPr>
+        </p:nvSpPr>
+        <p:spPr/>
+        <p:txBody>
+          <a:bodyPr/>
+          <a:lstStyle/>
+          <a:p>
+            <a:pPr>
+              <a:defRPr/>
+            </a:pPr>
+            <a:r>
+              <a:rPr lang="en-US" dirty="0"/>
+              <a:t>Week3R - </a:t>
+            </a:r>
+            <a:fld id="{2E4790E1-2590-4AEE-892D-AB46A7688113}" type="slidenum">
+              <a:rPr lang="en-US" smtClean="0"/>
+              <a:pPr>
+                <a:defRPr/>
+              </a:pPr>
+              <a:t>2</a:t>
+            </a:fld>
             <a:endParaRPr lang="en-US" dirty="0"/>
           </a:p>
         </p:txBody>
@@ -12698,6 +13284,45 @@
           </a:p>
         </p:txBody>
       </p:sp>
+      <p:sp>
+        <p:nvSpPr>
+          <p:cNvPr id="5" name="Slide Number Placeholder 4">
+            <a:extLst>
+              <a:ext uri="{FF2B5EF4-FFF2-40B4-BE49-F238E27FC236}">
+                <a16:creationId xmlns:a16="http://schemas.microsoft.com/office/drawing/2014/main" id="{5A1D4A4D-7C1F-22A2-9FFC-F79C2D0FF241}"/>
+              </a:ext>
+            </a:extLst>
+          </p:cNvPr>
+          <p:cNvSpPr>
+            <a:spLocks noGrp="1"/>
+          </p:cNvSpPr>
+          <p:nvPr>
+            <p:ph type="sldNum" sz="quarter" idx="12"/>
+          </p:nvPr>
+        </p:nvSpPr>
+        <p:spPr/>
+        <p:txBody>
+          <a:bodyPr/>
+          <a:lstStyle/>
+          <a:p>
+            <a:pPr>
+              <a:defRPr/>
+            </a:pPr>
+            <a:r>
+              <a:rPr lang="en-US" dirty="0"/>
+              <a:t>Week3R - </a:t>
+            </a:r>
+            <a:fld id="{2E4790E1-2590-4AEE-892D-AB46A7688113}" type="slidenum">
+              <a:rPr lang="en-US" smtClean="0"/>
+              <a:pPr>
+                <a:defRPr/>
+              </a:pPr>
+              <a:t>3</a:t>
+            </a:fld>
+            <a:endParaRPr lang="en-US" dirty="0"/>
+          </a:p>
+        </p:txBody>
+      </p:sp>
     </p:spTree>
     <p:extLst>
       <p:ext uri="{BB962C8B-B14F-4D97-AF65-F5344CB8AC3E}">
@@ -13650,6 +14275,45 @@
               <a:rPr lang="en-US"/>
               <a:t>CS1010 (AY2023/24 Semester 2)</a:t>
             </a:r>
+            <a:endParaRPr lang="en-US" dirty="0"/>
+          </a:p>
+        </p:txBody>
+      </p:sp>
+      <p:sp>
+        <p:nvSpPr>
+          <p:cNvPr id="5" name="Slide Number Placeholder 4">
+            <a:extLst>
+              <a:ext uri="{FF2B5EF4-FFF2-40B4-BE49-F238E27FC236}">
+                <a16:creationId xmlns:a16="http://schemas.microsoft.com/office/drawing/2014/main" id="{C71938E5-94E3-A7B4-982C-77880F377DE2}"/>
+              </a:ext>
+            </a:extLst>
+          </p:cNvPr>
+          <p:cNvSpPr>
+            <a:spLocks noGrp="1"/>
+          </p:cNvSpPr>
+          <p:nvPr>
+            <p:ph type="sldNum" sz="quarter" idx="12"/>
+          </p:nvPr>
+        </p:nvSpPr>
+        <p:spPr/>
+        <p:txBody>
+          <a:bodyPr/>
+          <a:lstStyle/>
+          <a:p>
+            <a:pPr>
+              <a:defRPr/>
+            </a:pPr>
+            <a:r>
+              <a:rPr lang="en-US" dirty="0"/>
+              <a:t>Week3R - </a:t>
+            </a:r>
+            <a:fld id="{2E4790E1-2590-4AEE-892D-AB46A7688113}" type="slidenum">
+              <a:rPr lang="en-US" smtClean="0"/>
+              <a:pPr>
+                <a:defRPr/>
+              </a:pPr>
+              <a:t>4</a:t>
+            </a:fld>
             <a:endParaRPr lang="en-US" dirty="0"/>
           </a:p>
         </p:txBody>
@@ -15786,6 +16450,45 @@
               <a:rPr lang="en-US"/>
               <a:t>CS1010 (AY2023/24 Semester 2)</a:t>
             </a:r>
+            <a:endParaRPr lang="en-US" dirty="0"/>
+          </a:p>
+        </p:txBody>
+      </p:sp>
+      <p:sp>
+        <p:nvSpPr>
+          <p:cNvPr id="3" name="Slide Number Placeholder 2">
+            <a:extLst>
+              <a:ext uri="{FF2B5EF4-FFF2-40B4-BE49-F238E27FC236}">
+                <a16:creationId xmlns:a16="http://schemas.microsoft.com/office/drawing/2014/main" id="{3E095A78-BE48-028F-6AA9-089A366CA9B3}"/>
+              </a:ext>
+            </a:extLst>
+          </p:cNvPr>
+          <p:cNvSpPr>
+            <a:spLocks noGrp="1"/>
+          </p:cNvSpPr>
+          <p:nvPr>
+            <p:ph type="sldNum" sz="quarter" idx="12"/>
+          </p:nvPr>
+        </p:nvSpPr>
+        <p:spPr/>
+        <p:txBody>
+          <a:bodyPr/>
+          <a:lstStyle/>
+          <a:p>
+            <a:pPr>
+              <a:defRPr/>
+            </a:pPr>
+            <a:r>
+              <a:rPr lang="en-US" dirty="0"/>
+              <a:t>Week3R - </a:t>
+            </a:r>
+            <a:fld id="{2E4790E1-2590-4AEE-892D-AB46A7688113}" type="slidenum">
+              <a:rPr lang="en-US" smtClean="0"/>
+              <a:pPr>
+                <a:defRPr/>
+              </a:pPr>
+              <a:t>5</a:t>
+            </a:fld>
             <a:endParaRPr lang="en-US" dirty="0"/>
           </a:p>
         </p:txBody>
@@ -16939,6 +17642,45 @@
           </a:p>
         </p:txBody>
       </p:sp>
+      <p:sp>
+        <p:nvSpPr>
+          <p:cNvPr id="3" name="Slide Number Placeholder 2">
+            <a:extLst>
+              <a:ext uri="{FF2B5EF4-FFF2-40B4-BE49-F238E27FC236}">
+                <a16:creationId xmlns:a16="http://schemas.microsoft.com/office/drawing/2014/main" id="{9C100D60-340C-73E3-2BF1-03764A1993DA}"/>
+              </a:ext>
+            </a:extLst>
+          </p:cNvPr>
+          <p:cNvSpPr>
+            <a:spLocks noGrp="1"/>
+          </p:cNvSpPr>
+          <p:nvPr>
+            <p:ph type="sldNum" sz="quarter" idx="12"/>
+          </p:nvPr>
+        </p:nvSpPr>
+        <p:spPr/>
+        <p:txBody>
+          <a:bodyPr/>
+          <a:lstStyle/>
+          <a:p>
+            <a:pPr>
+              <a:defRPr/>
+            </a:pPr>
+            <a:r>
+              <a:rPr lang="en-US" dirty="0"/>
+              <a:t>Week3R - </a:t>
+            </a:r>
+            <a:fld id="{2E4790E1-2590-4AEE-892D-AB46A7688113}" type="slidenum">
+              <a:rPr lang="en-US" smtClean="0"/>
+              <a:pPr>
+                <a:defRPr/>
+              </a:pPr>
+              <a:t>6</a:t>
+            </a:fld>
+            <a:endParaRPr lang="en-US" dirty="0"/>
+          </a:p>
+        </p:txBody>
+      </p:sp>
     </p:spTree>
     <p:extLst>
       <p:ext uri="{BB962C8B-B14F-4D97-AF65-F5344CB8AC3E}">
@@ -17572,6 +18314,45 @@
               <a:rPr lang="en-US"/>
               <a:t>CS1010 (AY2023/24 Semester 2)</a:t>
             </a:r>
+            <a:endParaRPr lang="en-US" dirty="0"/>
+          </a:p>
+        </p:txBody>
+      </p:sp>
+      <p:sp>
+        <p:nvSpPr>
+          <p:cNvPr id="3" name="Slide Number Placeholder 2">
+            <a:extLst>
+              <a:ext uri="{FF2B5EF4-FFF2-40B4-BE49-F238E27FC236}">
+                <a16:creationId xmlns:a16="http://schemas.microsoft.com/office/drawing/2014/main" id="{E973F187-712C-97AB-366C-17C2AB5FA29D}"/>
+              </a:ext>
+            </a:extLst>
+          </p:cNvPr>
+          <p:cNvSpPr>
+            <a:spLocks noGrp="1"/>
+          </p:cNvSpPr>
+          <p:nvPr>
+            <p:ph type="sldNum" sz="quarter" idx="12"/>
+          </p:nvPr>
+        </p:nvSpPr>
+        <p:spPr/>
+        <p:txBody>
+          <a:bodyPr/>
+          <a:lstStyle/>
+          <a:p>
+            <a:pPr>
+              <a:defRPr/>
+            </a:pPr>
+            <a:r>
+              <a:rPr lang="en-US" dirty="0"/>
+              <a:t>Week3R - </a:t>
+            </a:r>
+            <a:fld id="{2E4790E1-2590-4AEE-892D-AB46A7688113}" type="slidenum">
+              <a:rPr lang="en-US" smtClean="0"/>
+              <a:pPr>
+                <a:defRPr/>
+              </a:pPr>
+              <a:t>7</a:t>
+            </a:fld>
             <a:endParaRPr lang="en-US" dirty="0"/>
           </a:p>
         </p:txBody>
@@ -18229,6 +19010,45 @@
           </a:p>
         </p:txBody>
       </p:sp>
+      <p:sp>
+        <p:nvSpPr>
+          <p:cNvPr id="3" name="Slide Number Placeholder 2">
+            <a:extLst>
+              <a:ext uri="{FF2B5EF4-FFF2-40B4-BE49-F238E27FC236}">
+                <a16:creationId xmlns:a16="http://schemas.microsoft.com/office/drawing/2014/main" id="{2289870A-E99C-0D18-B0C9-82800E2E917F}"/>
+              </a:ext>
+            </a:extLst>
+          </p:cNvPr>
+          <p:cNvSpPr>
+            <a:spLocks noGrp="1"/>
+          </p:cNvSpPr>
+          <p:nvPr>
+            <p:ph type="sldNum" sz="quarter" idx="12"/>
+          </p:nvPr>
+        </p:nvSpPr>
+        <p:spPr/>
+        <p:txBody>
+          <a:bodyPr/>
+          <a:lstStyle/>
+          <a:p>
+            <a:pPr>
+              <a:defRPr/>
+            </a:pPr>
+            <a:r>
+              <a:rPr lang="en-US" dirty="0"/>
+              <a:t>Week3R - </a:t>
+            </a:r>
+            <a:fld id="{2E4790E1-2590-4AEE-892D-AB46A7688113}" type="slidenum">
+              <a:rPr lang="en-US" smtClean="0"/>
+              <a:pPr>
+                <a:defRPr/>
+              </a:pPr>
+              <a:t>8</a:t>
+            </a:fld>
+            <a:endParaRPr lang="en-US" dirty="0"/>
+          </a:p>
+        </p:txBody>
+      </p:sp>
     </p:spTree>
     <p:extLst>
       <p:ext uri="{BB962C8B-B14F-4D97-AF65-F5344CB8AC3E}">
@@ -19146,6 +19966,45 @@
               <a:rPr lang="en-US"/>
               <a:t>CS1010 (AY2023/24 Semester 2)</a:t>
             </a:r>
+            <a:endParaRPr lang="en-US" dirty="0"/>
+          </a:p>
+        </p:txBody>
+      </p:sp>
+      <p:sp>
+        <p:nvSpPr>
+          <p:cNvPr id="3" name="Slide Number Placeholder 2">
+            <a:extLst>
+              <a:ext uri="{FF2B5EF4-FFF2-40B4-BE49-F238E27FC236}">
+                <a16:creationId xmlns:a16="http://schemas.microsoft.com/office/drawing/2014/main" id="{E0342226-2BC1-78AC-E599-2D6DEFCF035F}"/>
+              </a:ext>
+            </a:extLst>
+          </p:cNvPr>
+          <p:cNvSpPr>
+            <a:spLocks noGrp="1"/>
+          </p:cNvSpPr>
+          <p:nvPr>
+            <p:ph type="sldNum" sz="quarter" idx="12"/>
+          </p:nvPr>
+        </p:nvSpPr>
+        <p:spPr/>
+        <p:txBody>
+          <a:bodyPr/>
+          <a:lstStyle/>
+          <a:p>
+            <a:pPr>
+              <a:defRPr/>
+            </a:pPr>
+            <a:r>
+              <a:rPr lang="en-US" dirty="0"/>
+              <a:t>Week3R - </a:t>
+            </a:r>
+            <a:fld id="{2E4790E1-2590-4AEE-892D-AB46A7688113}" type="slidenum">
+              <a:rPr lang="en-US" smtClean="0"/>
+              <a:pPr>
+                <a:defRPr/>
+              </a:pPr>
+              <a:t>9</a:t>
+            </a:fld>
             <a:endParaRPr lang="en-US" dirty="0"/>
           </a:p>
         </p:txBody>

</xml_diff>